<commit_message>
Updated REAME and bitstream
</commit_message>
<xml_diff>
--- a/README.pptx
+++ b/README.pptx
@@ -10,6 +10,7 @@
     <p:sldId id="271" r:id="rId4"/>
     <p:sldId id="266" r:id="rId5"/>
     <p:sldId id="270" r:id="rId6"/>
+    <p:sldId id="272" r:id="rId7"/>
   </p:sldIdLst>
   <p:sldSz cx="12192000" cy="6858000"/>
   <p:notesSz cx="6858000" cy="9144000"/>
@@ -7259,6 +7260,1009 @@
 </p:sld>
 </file>
 
+<file path=ppt/slides/slide6.xml><?xml version="1.0" encoding="utf-8"?>
+<p:sld xmlns:a="http://schemas.openxmlformats.org/drawingml/2006/main" xmlns:r="http://schemas.openxmlformats.org/officeDocument/2006/relationships" xmlns:p="http://schemas.openxmlformats.org/presentationml/2006/main">
+  <p:cSld>
+    <p:spTree>
+      <p:nvGrpSpPr>
+        <p:cNvPr id="1" name=""/>
+        <p:cNvGrpSpPr/>
+        <p:nvPr/>
+      </p:nvGrpSpPr>
+      <p:grpSpPr>
+        <a:xfrm>
+          <a:off x="0" y="0"/>
+          <a:ext cx="0" cy="0"/>
+          <a:chOff x="0" y="0"/>
+          <a:chExt cx="0" cy="0"/>
+        </a:xfrm>
+      </p:grpSpPr>
+      <p:sp>
+        <p:nvSpPr>
+          <p:cNvPr id="8" name="Title 1"/>
+          <p:cNvSpPr txBox="1">
+            <a:spLocks/>
+          </p:cNvSpPr>
+          <p:nvPr/>
+        </p:nvSpPr>
+        <p:spPr>
+          <a:xfrm>
+            <a:off x="465220" y="64168"/>
+            <a:ext cx="10058400" cy="925307"/>
+          </a:xfrm>
+          <a:prstGeom prst="rect">
+            <a:avLst/>
+          </a:prstGeom>
+        </p:spPr>
+        <p:txBody>
+          <a:bodyPr vert="horz" lIns="91440" tIns="45720" rIns="91440" bIns="45720" rtlCol="0" anchor="ctr">
+            <a:normAutofit/>
+          </a:bodyPr>
+          <a:lstStyle>
+            <a:lvl1pPr algn="l" defTabSz="914400" rtl="0" eaLnBrk="1" latinLnBrk="0" hangingPunct="1">
+              <a:lnSpc>
+                <a:spcPct val="90000"/>
+              </a:lnSpc>
+              <a:spcBef>
+                <a:spcPct val="0"/>
+              </a:spcBef>
+              <a:buNone/>
+              <a:defRPr sz="5400" kern="1200" cap="all" baseline="0">
+                <a:blipFill>
+                  <a:blip r:embed="rId2">
+                    <a:extLst>
+                      <a:ext uri="{28A0092B-C50C-407E-A947-70E740481C1C}">
+                        <a14:useLocalDpi xmlns:a14="http://schemas.microsoft.com/office/drawing/2010/main" val="0"/>
+                      </a:ext>
+                    </a:extLst>
+                  </a:blip>
+                  <a:tile tx="6350" ty="-127000" sx="65000" sy="64000" flip="none" algn="tl"/>
+                </a:blipFill>
+                <a:latin typeface="+mj-lt"/>
+                <a:ea typeface="+mj-ea"/>
+                <a:cs typeface="+mj-cs"/>
+              </a:defRPr>
+            </a:lvl1pPr>
+          </a:lstStyle>
+          <a:p>
+            <a:endParaRPr lang="en-US" dirty="0"/>
+          </a:p>
+        </p:txBody>
+      </p:sp>
+      <p:sp>
+        <p:nvSpPr>
+          <p:cNvPr id="9" name="Line 7"/>
+          <p:cNvSpPr>
+            <a:spLocks noChangeShapeType="1"/>
+          </p:cNvSpPr>
+          <p:nvPr/>
+        </p:nvSpPr>
+        <p:spPr bwMode="auto">
+          <a:xfrm flipV="1">
+            <a:off x="465220" y="1013537"/>
+            <a:ext cx="11237495" cy="1"/>
+          </a:xfrm>
+          <a:prstGeom prst="line">
+            <a:avLst/>
+          </a:prstGeom>
+          <a:noFill/>
+          <a:ln w="28575">
+            <a:solidFill>
+              <a:srgbClr val="000000"/>
+            </a:solidFill>
+            <a:round/>
+            <a:headEnd/>
+            <a:tailEnd/>
+          </a:ln>
+        </p:spPr>
+        <p:txBody>
+          <a:bodyPr wrap="square" anchor="ctr">
+            <a:prstTxWarp prst="textNoShape">
+              <a:avLst/>
+            </a:prstTxWarp>
+            <a:spAutoFit/>
+          </a:bodyPr>
+          <a:lstStyle/>
+          <a:p>
+            <a:endParaRPr lang="en-US" dirty="0"/>
+          </a:p>
+        </p:txBody>
+      </p:sp>
+      <p:pic>
+        <p:nvPicPr>
+          <p:cNvPr id="10" name="Picture 9"/>
+          <p:cNvPicPr>
+            <a:picLocks noChangeAspect="1"/>
+          </p:cNvPicPr>
+          <p:nvPr/>
+        </p:nvPicPr>
+        <p:blipFill>
+          <a:blip r:embed="rId3"/>
+          <a:stretch>
+            <a:fillRect/>
+          </a:stretch>
+        </p:blipFill>
+        <p:spPr>
+          <a:xfrm>
+            <a:off x="9947757" y="152011"/>
+            <a:ext cx="1937836" cy="708780"/>
+          </a:xfrm>
+          <a:prstGeom prst="rect">
+            <a:avLst/>
+          </a:prstGeom>
+        </p:spPr>
+      </p:pic>
+      <p:sp>
+        <p:nvSpPr>
+          <p:cNvPr id="12" name="Text Placeholder 2"/>
+          <p:cNvSpPr txBox="1">
+            <a:spLocks/>
+          </p:cNvSpPr>
+          <p:nvPr/>
+        </p:nvSpPr>
+        <p:spPr>
+          <a:xfrm>
+            <a:off x="462171" y="1013537"/>
+            <a:ext cx="5633827" cy="640080"/>
+          </a:xfrm>
+          <a:prstGeom prst="rect">
+            <a:avLst/>
+          </a:prstGeom>
+        </p:spPr>
+        <p:txBody>
+          <a:bodyPr vert="horz" lIns="91440" tIns="45720" rIns="91440" bIns="45720" rtlCol="0" anchor="ctr">
+            <a:normAutofit/>
+          </a:bodyPr>
+          <a:lstStyle>
+            <a:lvl1pPr marL="0" indent="0" algn="l" defTabSz="914400" rtl="0" eaLnBrk="1" latinLnBrk="0" hangingPunct="1">
+              <a:lnSpc>
+                <a:spcPct val="90000"/>
+              </a:lnSpc>
+              <a:spcBef>
+                <a:spcPts val="1200"/>
+              </a:spcBef>
+              <a:buClr>
+                <a:schemeClr val="accent1">
+                  <a:lumMod val="75000"/>
+                </a:schemeClr>
+              </a:buClr>
+              <a:buSzPct val="85000"/>
+              <a:buFont typeface="Wingdings" pitchFamily="2" charset="2"/>
+              <a:buNone/>
+              <a:defRPr sz="2000" b="1" kern="1200">
+                <a:solidFill>
+                  <a:schemeClr val="accent1">
+                    <a:lumMod val="75000"/>
+                  </a:schemeClr>
+                </a:solidFill>
+                <a:latin typeface="+mn-lt"/>
+                <a:ea typeface="+mn-ea"/>
+                <a:cs typeface="+mn-cs"/>
+              </a:defRPr>
+            </a:lvl1pPr>
+            <a:lvl2pPr marL="457200" indent="0" algn="l" defTabSz="914400" rtl="0" eaLnBrk="1" latinLnBrk="0" hangingPunct="1">
+              <a:lnSpc>
+                <a:spcPct val="90000"/>
+              </a:lnSpc>
+              <a:spcBef>
+                <a:spcPts val="400"/>
+              </a:spcBef>
+              <a:spcAft>
+                <a:spcPts val="200"/>
+              </a:spcAft>
+              <a:buClr>
+                <a:schemeClr val="accent1">
+                  <a:lumMod val="75000"/>
+                </a:schemeClr>
+              </a:buClr>
+              <a:buSzPct val="85000"/>
+              <a:buFont typeface="Wingdings" pitchFamily="2" charset="2"/>
+              <a:buNone/>
+              <a:defRPr sz="2000" b="1" kern="1200">
+                <a:solidFill>
+                  <a:schemeClr val="tx1"/>
+                </a:solidFill>
+                <a:latin typeface="+mn-lt"/>
+                <a:ea typeface="+mn-ea"/>
+                <a:cs typeface="+mn-cs"/>
+              </a:defRPr>
+            </a:lvl2pPr>
+            <a:lvl3pPr marL="914400" indent="0" algn="l" defTabSz="914400" rtl="0" eaLnBrk="1" latinLnBrk="0" hangingPunct="1">
+              <a:lnSpc>
+                <a:spcPct val="90000"/>
+              </a:lnSpc>
+              <a:spcBef>
+                <a:spcPts val="400"/>
+              </a:spcBef>
+              <a:spcAft>
+                <a:spcPts val="200"/>
+              </a:spcAft>
+              <a:buClr>
+                <a:schemeClr val="accent1">
+                  <a:lumMod val="75000"/>
+                </a:schemeClr>
+              </a:buClr>
+              <a:buSzPct val="85000"/>
+              <a:buFont typeface="Wingdings" pitchFamily="2" charset="2"/>
+              <a:buNone/>
+              <a:defRPr sz="1800" b="1" kern="1200">
+                <a:solidFill>
+                  <a:schemeClr val="tx1"/>
+                </a:solidFill>
+                <a:latin typeface="+mn-lt"/>
+                <a:ea typeface="+mn-ea"/>
+                <a:cs typeface="+mn-cs"/>
+              </a:defRPr>
+            </a:lvl3pPr>
+            <a:lvl4pPr marL="1371600" indent="0" algn="l" defTabSz="914400" rtl="0" eaLnBrk="1" latinLnBrk="0" hangingPunct="1">
+              <a:lnSpc>
+                <a:spcPct val="90000"/>
+              </a:lnSpc>
+              <a:spcBef>
+                <a:spcPts val="400"/>
+              </a:spcBef>
+              <a:spcAft>
+                <a:spcPts val="200"/>
+              </a:spcAft>
+              <a:buClr>
+                <a:schemeClr val="accent1">
+                  <a:lumMod val="75000"/>
+                </a:schemeClr>
+              </a:buClr>
+              <a:buSzPct val="85000"/>
+              <a:buFont typeface="Wingdings" pitchFamily="2" charset="2"/>
+              <a:buNone/>
+              <a:defRPr sz="1600" b="1" kern="1200">
+                <a:solidFill>
+                  <a:schemeClr val="tx1"/>
+                </a:solidFill>
+                <a:latin typeface="+mn-lt"/>
+                <a:ea typeface="+mn-ea"/>
+                <a:cs typeface="+mn-cs"/>
+              </a:defRPr>
+            </a:lvl4pPr>
+            <a:lvl5pPr marL="1828800" indent="0" algn="l" defTabSz="914400" rtl="0" eaLnBrk="1" latinLnBrk="0" hangingPunct="1">
+              <a:lnSpc>
+                <a:spcPct val="90000"/>
+              </a:lnSpc>
+              <a:spcBef>
+                <a:spcPts val="400"/>
+              </a:spcBef>
+              <a:spcAft>
+                <a:spcPts val="200"/>
+              </a:spcAft>
+              <a:buClr>
+                <a:schemeClr val="accent1">
+                  <a:lumMod val="75000"/>
+                </a:schemeClr>
+              </a:buClr>
+              <a:buSzPct val="85000"/>
+              <a:buFont typeface="Wingdings" pitchFamily="2" charset="2"/>
+              <a:buNone/>
+              <a:defRPr sz="1600" b="1" kern="1200">
+                <a:solidFill>
+                  <a:schemeClr val="tx1"/>
+                </a:solidFill>
+                <a:latin typeface="+mn-lt"/>
+                <a:ea typeface="+mn-ea"/>
+                <a:cs typeface="+mn-cs"/>
+              </a:defRPr>
+            </a:lvl5pPr>
+            <a:lvl6pPr marL="2286000" indent="0" algn="l" defTabSz="914400" rtl="0" eaLnBrk="1" latinLnBrk="0" hangingPunct="1">
+              <a:lnSpc>
+                <a:spcPct val="90000"/>
+              </a:lnSpc>
+              <a:spcBef>
+                <a:spcPts val="400"/>
+              </a:spcBef>
+              <a:spcAft>
+                <a:spcPts val="200"/>
+              </a:spcAft>
+              <a:buClr>
+                <a:schemeClr val="accent1">
+                  <a:lumMod val="75000"/>
+                </a:schemeClr>
+              </a:buClr>
+              <a:buSzPct val="85000"/>
+              <a:buFont typeface="Wingdings" pitchFamily="2" charset="2"/>
+              <a:buNone/>
+              <a:defRPr sz="1600" b="1" kern="1200">
+                <a:solidFill>
+                  <a:schemeClr val="tx1"/>
+                </a:solidFill>
+                <a:latin typeface="+mn-lt"/>
+                <a:ea typeface="+mn-ea"/>
+                <a:cs typeface="+mn-cs"/>
+              </a:defRPr>
+            </a:lvl6pPr>
+            <a:lvl7pPr marL="2743200" indent="0" algn="l" defTabSz="914400" rtl="0" eaLnBrk="1" latinLnBrk="0" hangingPunct="1">
+              <a:lnSpc>
+                <a:spcPct val="90000"/>
+              </a:lnSpc>
+              <a:spcBef>
+                <a:spcPts val="400"/>
+              </a:spcBef>
+              <a:spcAft>
+                <a:spcPts val="200"/>
+              </a:spcAft>
+              <a:buClr>
+                <a:schemeClr val="accent1">
+                  <a:lumMod val="75000"/>
+                </a:schemeClr>
+              </a:buClr>
+              <a:buSzPct val="85000"/>
+              <a:buFont typeface="Wingdings" pitchFamily="2" charset="2"/>
+              <a:buNone/>
+              <a:defRPr sz="1600" b="1" kern="1200">
+                <a:solidFill>
+                  <a:schemeClr val="tx1"/>
+                </a:solidFill>
+                <a:latin typeface="+mn-lt"/>
+                <a:ea typeface="+mn-ea"/>
+                <a:cs typeface="+mn-cs"/>
+              </a:defRPr>
+            </a:lvl7pPr>
+            <a:lvl8pPr marL="3200400" indent="0" algn="l" defTabSz="914400" rtl="0" eaLnBrk="1" latinLnBrk="0" hangingPunct="1">
+              <a:lnSpc>
+                <a:spcPct val="90000"/>
+              </a:lnSpc>
+              <a:spcBef>
+                <a:spcPts val="400"/>
+              </a:spcBef>
+              <a:spcAft>
+                <a:spcPts val="200"/>
+              </a:spcAft>
+              <a:buClr>
+                <a:schemeClr val="accent1">
+                  <a:lumMod val="75000"/>
+                </a:schemeClr>
+              </a:buClr>
+              <a:buSzPct val="85000"/>
+              <a:buFont typeface="Wingdings" pitchFamily="2" charset="2"/>
+              <a:buNone/>
+              <a:defRPr sz="1600" b="1" kern="1200">
+                <a:solidFill>
+                  <a:schemeClr val="tx1"/>
+                </a:solidFill>
+                <a:latin typeface="+mn-lt"/>
+                <a:ea typeface="+mn-ea"/>
+                <a:cs typeface="+mn-cs"/>
+              </a:defRPr>
+            </a:lvl8pPr>
+            <a:lvl9pPr marL="3657600" indent="0" algn="l" defTabSz="914400" rtl="0" eaLnBrk="1" latinLnBrk="0" hangingPunct="1">
+              <a:lnSpc>
+                <a:spcPct val="90000"/>
+              </a:lnSpc>
+              <a:spcBef>
+                <a:spcPts val="400"/>
+              </a:spcBef>
+              <a:spcAft>
+                <a:spcPts val="200"/>
+              </a:spcAft>
+              <a:buClr>
+                <a:schemeClr val="accent1">
+                  <a:lumMod val="75000"/>
+                </a:schemeClr>
+              </a:buClr>
+              <a:buSzPct val="85000"/>
+              <a:buFont typeface="Wingdings" pitchFamily="2" charset="2"/>
+              <a:buNone/>
+              <a:defRPr sz="1600" b="1" kern="1200">
+                <a:solidFill>
+                  <a:schemeClr val="tx1"/>
+                </a:solidFill>
+                <a:latin typeface="+mn-lt"/>
+                <a:ea typeface="+mn-ea"/>
+                <a:cs typeface="+mn-cs"/>
+              </a:defRPr>
+            </a:lvl9pPr>
+          </a:lstStyle>
+          <a:p>
+            <a:r>
+              <a:rPr lang="en-US" dirty="0" smtClean="0"/>
+              <a:t>Fake Camera:</a:t>
+            </a:r>
+          </a:p>
+        </p:txBody>
+      </p:sp>
+      <p:sp>
+        <p:nvSpPr>
+          <p:cNvPr id="13" name="Content Placeholder 3"/>
+          <p:cNvSpPr txBox="1">
+            <a:spLocks/>
+          </p:cNvSpPr>
+          <p:nvPr/>
+        </p:nvSpPr>
+        <p:spPr>
+          <a:xfrm>
+            <a:off x="465219" y="1511850"/>
+            <a:ext cx="11237496" cy="2377353"/>
+          </a:xfrm>
+          <a:prstGeom prst="rect">
+            <a:avLst/>
+          </a:prstGeom>
+        </p:spPr>
+        <p:txBody>
+          <a:bodyPr vert="horz" lIns="91440" tIns="45720" rIns="91440" bIns="45720" rtlCol="0">
+            <a:normAutofit/>
+          </a:bodyPr>
+          <a:lstStyle>
+            <a:lvl1pPr marL="182880" indent="-182880" algn="l" defTabSz="914400" rtl="0" eaLnBrk="1" latinLnBrk="0" hangingPunct="1">
+              <a:lnSpc>
+                <a:spcPct val="90000"/>
+              </a:lnSpc>
+              <a:spcBef>
+                <a:spcPts val="1200"/>
+              </a:spcBef>
+              <a:buClr>
+                <a:schemeClr val="accent1">
+                  <a:lumMod val="75000"/>
+                </a:schemeClr>
+              </a:buClr>
+              <a:buSzPct val="85000"/>
+              <a:buFont typeface="Wingdings" pitchFamily="2" charset="2"/>
+              <a:buChar char="§"/>
+              <a:defRPr sz="2000" kern="1200">
+                <a:solidFill>
+                  <a:schemeClr val="tx1"/>
+                </a:solidFill>
+                <a:latin typeface="+mn-lt"/>
+                <a:ea typeface="+mn-ea"/>
+                <a:cs typeface="+mn-cs"/>
+              </a:defRPr>
+            </a:lvl1pPr>
+            <a:lvl2pPr marL="457200" indent="-182880" algn="l" defTabSz="914400" rtl="0" eaLnBrk="1" latinLnBrk="0" hangingPunct="1">
+              <a:lnSpc>
+                <a:spcPct val="90000"/>
+              </a:lnSpc>
+              <a:spcBef>
+                <a:spcPts val="400"/>
+              </a:spcBef>
+              <a:spcAft>
+                <a:spcPts val="200"/>
+              </a:spcAft>
+              <a:buClr>
+                <a:schemeClr val="accent1">
+                  <a:lumMod val="75000"/>
+                </a:schemeClr>
+              </a:buClr>
+              <a:buSzPct val="85000"/>
+              <a:buFont typeface="Wingdings" pitchFamily="2" charset="2"/>
+              <a:buChar char="§"/>
+              <a:defRPr sz="1800" kern="1200">
+                <a:solidFill>
+                  <a:schemeClr val="tx1"/>
+                </a:solidFill>
+                <a:latin typeface="+mn-lt"/>
+                <a:ea typeface="+mn-ea"/>
+                <a:cs typeface="+mn-cs"/>
+              </a:defRPr>
+            </a:lvl2pPr>
+            <a:lvl3pPr marL="731520" indent="-182880" algn="l" defTabSz="914400" rtl="0" eaLnBrk="1" latinLnBrk="0" hangingPunct="1">
+              <a:lnSpc>
+                <a:spcPct val="90000"/>
+              </a:lnSpc>
+              <a:spcBef>
+                <a:spcPts val="400"/>
+              </a:spcBef>
+              <a:spcAft>
+                <a:spcPts val="200"/>
+              </a:spcAft>
+              <a:buClr>
+                <a:schemeClr val="accent1">
+                  <a:lumMod val="75000"/>
+                </a:schemeClr>
+              </a:buClr>
+              <a:buSzPct val="85000"/>
+              <a:buFont typeface="Wingdings" pitchFamily="2" charset="2"/>
+              <a:buChar char="§"/>
+              <a:defRPr sz="1600" kern="1200">
+                <a:solidFill>
+                  <a:schemeClr val="tx1"/>
+                </a:solidFill>
+                <a:latin typeface="+mn-lt"/>
+                <a:ea typeface="+mn-ea"/>
+                <a:cs typeface="+mn-cs"/>
+              </a:defRPr>
+            </a:lvl3pPr>
+            <a:lvl4pPr marL="1005840" indent="-182880" algn="l" defTabSz="914400" rtl="0" eaLnBrk="1" latinLnBrk="0" hangingPunct="1">
+              <a:lnSpc>
+                <a:spcPct val="90000"/>
+              </a:lnSpc>
+              <a:spcBef>
+                <a:spcPts val="400"/>
+              </a:spcBef>
+              <a:spcAft>
+                <a:spcPts val="200"/>
+              </a:spcAft>
+              <a:buClr>
+                <a:schemeClr val="accent1">
+                  <a:lumMod val="75000"/>
+                </a:schemeClr>
+              </a:buClr>
+              <a:buSzPct val="85000"/>
+              <a:buFont typeface="Wingdings" pitchFamily="2" charset="2"/>
+              <a:buChar char="§"/>
+              <a:defRPr sz="1600" kern="1200">
+                <a:solidFill>
+                  <a:schemeClr val="tx1"/>
+                </a:solidFill>
+                <a:latin typeface="+mn-lt"/>
+                <a:ea typeface="+mn-ea"/>
+                <a:cs typeface="+mn-cs"/>
+              </a:defRPr>
+            </a:lvl4pPr>
+            <a:lvl5pPr marL="1280160" indent="-182880" algn="l" defTabSz="914400" rtl="0" eaLnBrk="1" latinLnBrk="0" hangingPunct="1">
+              <a:lnSpc>
+                <a:spcPct val="90000"/>
+              </a:lnSpc>
+              <a:spcBef>
+                <a:spcPts val="400"/>
+              </a:spcBef>
+              <a:spcAft>
+                <a:spcPts val="200"/>
+              </a:spcAft>
+              <a:buClr>
+                <a:schemeClr val="accent1">
+                  <a:lumMod val="75000"/>
+                </a:schemeClr>
+              </a:buClr>
+              <a:buSzPct val="85000"/>
+              <a:buFont typeface="Wingdings" pitchFamily="2" charset="2"/>
+              <a:buChar char="§"/>
+              <a:defRPr sz="1600" kern="1200">
+                <a:solidFill>
+                  <a:schemeClr val="tx1"/>
+                </a:solidFill>
+                <a:latin typeface="+mn-lt"/>
+                <a:ea typeface="+mn-ea"/>
+                <a:cs typeface="+mn-cs"/>
+              </a:defRPr>
+            </a:lvl5pPr>
+            <a:lvl6pPr marL="1600000" indent="-228600" algn="l" defTabSz="914400" rtl="0" eaLnBrk="1" latinLnBrk="0" hangingPunct="1">
+              <a:lnSpc>
+                <a:spcPct val="90000"/>
+              </a:lnSpc>
+              <a:spcBef>
+                <a:spcPts val="400"/>
+              </a:spcBef>
+              <a:spcAft>
+                <a:spcPts val="200"/>
+              </a:spcAft>
+              <a:buClr>
+                <a:schemeClr val="accent1">
+                  <a:lumMod val="75000"/>
+                </a:schemeClr>
+              </a:buClr>
+              <a:buSzPct val="85000"/>
+              <a:buFont typeface="Wingdings" pitchFamily="2" charset="2"/>
+              <a:buChar char="§"/>
+              <a:defRPr sz="1600" kern="1200">
+                <a:solidFill>
+                  <a:schemeClr val="tx1"/>
+                </a:solidFill>
+                <a:latin typeface="+mn-lt"/>
+                <a:ea typeface="+mn-ea"/>
+                <a:cs typeface="+mn-cs"/>
+              </a:defRPr>
+            </a:lvl6pPr>
+            <a:lvl7pPr marL="1900000" indent="-228600" algn="l" defTabSz="914400" rtl="0" eaLnBrk="1" latinLnBrk="0" hangingPunct="1">
+              <a:lnSpc>
+                <a:spcPct val="90000"/>
+              </a:lnSpc>
+              <a:spcBef>
+                <a:spcPts val="400"/>
+              </a:spcBef>
+              <a:spcAft>
+                <a:spcPts val="200"/>
+              </a:spcAft>
+              <a:buClr>
+                <a:schemeClr val="accent1">
+                  <a:lumMod val="75000"/>
+                </a:schemeClr>
+              </a:buClr>
+              <a:buSzPct val="85000"/>
+              <a:buFont typeface="Wingdings" pitchFamily="2" charset="2"/>
+              <a:buChar char="§"/>
+              <a:defRPr sz="1600" kern="1200">
+                <a:solidFill>
+                  <a:schemeClr val="tx1"/>
+                </a:solidFill>
+                <a:latin typeface="+mn-lt"/>
+                <a:ea typeface="+mn-ea"/>
+                <a:cs typeface="+mn-cs"/>
+              </a:defRPr>
+            </a:lvl7pPr>
+            <a:lvl8pPr marL="2200000" indent="-228600" algn="l" defTabSz="914400" rtl="0" eaLnBrk="1" latinLnBrk="0" hangingPunct="1">
+              <a:lnSpc>
+                <a:spcPct val="90000"/>
+              </a:lnSpc>
+              <a:spcBef>
+                <a:spcPts val="400"/>
+              </a:spcBef>
+              <a:spcAft>
+                <a:spcPts val="200"/>
+              </a:spcAft>
+              <a:buClr>
+                <a:schemeClr val="accent1">
+                  <a:lumMod val="75000"/>
+                </a:schemeClr>
+              </a:buClr>
+              <a:buSzPct val="85000"/>
+              <a:buFont typeface="Wingdings" pitchFamily="2" charset="2"/>
+              <a:buChar char="§"/>
+              <a:defRPr sz="1600" kern="1200">
+                <a:solidFill>
+                  <a:schemeClr val="tx1"/>
+                </a:solidFill>
+                <a:latin typeface="+mn-lt"/>
+                <a:ea typeface="+mn-ea"/>
+                <a:cs typeface="+mn-cs"/>
+              </a:defRPr>
+            </a:lvl8pPr>
+            <a:lvl9pPr marL="2500000" indent="-228600" algn="l" defTabSz="914400" rtl="0" eaLnBrk="1" latinLnBrk="0" hangingPunct="1">
+              <a:lnSpc>
+                <a:spcPct val="90000"/>
+              </a:lnSpc>
+              <a:spcBef>
+                <a:spcPts val="400"/>
+              </a:spcBef>
+              <a:spcAft>
+                <a:spcPts val="200"/>
+              </a:spcAft>
+              <a:buClr>
+                <a:schemeClr val="accent1">
+                  <a:lumMod val="75000"/>
+                </a:schemeClr>
+              </a:buClr>
+              <a:buSzPct val="85000"/>
+              <a:buFont typeface="Wingdings" pitchFamily="2" charset="2"/>
+              <a:buChar char="§"/>
+              <a:defRPr sz="1600" kern="1200">
+                <a:solidFill>
+                  <a:schemeClr val="tx1"/>
+                </a:solidFill>
+                <a:latin typeface="+mn-lt"/>
+                <a:ea typeface="+mn-ea"/>
+                <a:cs typeface="+mn-cs"/>
+              </a:defRPr>
+            </a:lvl9pPr>
+          </a:lstStyle>
+          <a:p>
+            <a:endParaRPr lang="en-US" dirty="0"/>
+          </a:p>
+        </p:txBody>
+      </p:sp>
+      <p:sp>
+        <p:nvSpPr>
+          <p:cNvPr id="23" name="Title 1"/>
+          <p:cNvSpPr>
+            <a:spLocks noGrp="1"/>
+          </p:cNvSpPr>
+          <p:nvPr>
+            <p:ph type="title"/>
+          </p:nvPr>
+        </p:nvSpPr>
+        <p:spPr>
+          <a:xfrm>
+            <a:off x="617620" y="216568"/>
+            <a:ext cx="10058400" cy="925307"/>
+          </a:xfrm>
+        </p:spPr>
+        <p:txBody>
+          <a:bodyPr>
+            <a:noAutofit/>
+          </a:bodyPr>
+          <a:lstStyle/>
+          <a:p>
+            <a:r>
+              <a:rPr lang="en-US" sz="4000" dirty="0" smtClean="0"/>
+              <a:t>Fake Camera Simulator</a:t>
+            </a:r>
+            <a:endParaRPr lang="en-US" sz="4000" dirty="0"/>
+          </a:p>
+        </p:txBody>
+      </p:sp>
+      <p:sp>
+        <p:nvSpPr>
+          <p:cNvPr id="30" name="Content Placeholder 3"/>
+          <p:cNvSpPr>
+            <a:spLocks noGrp="1"/>
+          </p:cNvSpPr>
+          <p:nvPr>
+            <p:ph sz="half" idx="2"/>
+          </p:nvPr>
+        </p:nvSpPr>
+        <p:spPr>
+          <a:xfrm>
+            <a:off x="462171" y="1520014"/>
+            <a:ext cx="10249372" cy="2529471"/>
+          </a:xfrm>
+        </p:spPr>
+        <p:txBody>
+          <a:bodyPr>
+            <a:normAutofit fontScale="85000" lnSpcReduction="10000"/>
+          </a:bodyPr>
+          <a:lstStyle/>
+          <a:p>
+            <a:r>
+              <a:rPr lang="en-US" b="1" dirty="0"/>
+              <a:t>Additional </a:t>
+            </a:r>
+            <a:r>
+              <a:rPr lang="en-US" b="1" dirty="0" err="1"/>
+              <a:t>Matlab</a:t>
+            </a:r>
+            <a:r>
+              <a:rPr lang="en-US" b="1" dirty="0"/>
+              <a:t> code examples can be found in the </a:t>
+            </a:r>
+            <a:r>
+              <a:rPr lang="en-US" b="1" dirty="0" err="1"/>
+              <a:t>Matlab</a:t>
+            </a:r>
+            <a:r>
+              <a:rPr lang="en-US" b="1" dirty="0"/>
+              <a:t>/ directory.  Simply run the file to see expected outputs.</a:t>
+            </a:r>
+          </a:p>
+          <a:p>
+            <a:r>
+              <a:rPr lang="en-US" b="1" dirty="0" smtClean="0"/>
+              <a:t>A </a:t>
+            </a:r>
+            <a:r>
+              <a:rPr lang="en-US" b="1" dirty="0" err="1" smtClean="0"/>
+              <a:t>bitstream</a:t>
+            </a:r>
+            <a:r>
+              <a:rPr lang="en-US" b="1" dirty="0" smtClean="0"/>
+              <a:t> is available in the implement/ directory for programming the </a:t>
+            </a:r>
+            <a:r>
+              <a:rPr lang="en-US" b="1" dirty="0" err="1" smtClean="0"/>
+              <a:t>Basys</a:t>
+            </a:r>
+            <a:r>
+              <a:rPr lang="en-US" b="1" dirty="0" smtClean="0"/>
+              <a:t> 3 Board.</a:t>
+            </a:r>
+          </a:p>
+          <a:p>
+            <a:r>
+              <a:rPr lang="en-US" b="1" dirty="0" smtClean="0"/>
+              <a:t>The </a:t>
+            </a:r>
+            <a:r>
+              <a:rPr lang="en-US" b="1" dirty="0" err="1" smtClean="0"/>
+              <a:t>Basys</a:t>
+            </a:r>
+            <a:r>
+              <a:rPr lang="en-US" b="1" dirty="0" smtClean="0"/>
+              <a:t> 3 boards DIP Switches 0 &amp; 1 control the output images</a:t>
+            </a:r>
+          </a:p>
+          <a:p>
+            <a:r>
+              <a:rPr lang="en-US" b="1" dirty="0" smtClean="0"/>
+              <a:t>The </a:t>
+            </a:r>
+            <a:r>
+              <a:rPr lang="en-US" b="1" dirty="0" err="1" smtClean="0"/>
+              <a:t>Basys</a:t>
+            </a:r>
+            <a:r>
+              <a:rPr lang="en-US" b="1" dirty="0" smtClean="0"/>
+              <a:t> 3 boards DIP Switch 5 controls the </a:t>
+            </a:r>
+            <a:r>
+              <a:rPr lang="en-US" b="1" dirty="0" err="1" smtClean="0"/>
+              <a:t>colormap</a:t>
+            </a:r>
+            <a:r>
+              <a:rPr lang="en-US" b="1" dirty="0" smtClean="0"/>
+              <a:t> output</a:t>
+            </a:r>
+          </a:p>
+          <a:p>
+            <a:r>
+              <a:rPr lang="en-US" b="1" dirty="0" smtClean="0"/>
+              <a:t>NOTE: The VGA is not completely functional, so some monitors may not be able to handle the unstable output</a:t>
+            </a:r>
+            <a:r>
+              <a:rPr lang="en-US" b="1" dirty="0" smtClean="0"/>
+              <a:t>.</a:t>
+            </a:r>
+          </a:p>
+          <a:p>
+            <a:r>
+              <a:rPr lang="en-US" b="1" dirty="0" smtClean="0"/>
+              <a:t>Below </a:t>
+            </a:r>
+            <a:r>
+              <a:rPr lang="en-US" b="1" dirty="0" smtClean="0"/>
+              <a:t>are example outputs:</a:t>
+            </a:r>
+            <a:endParaRPr lang="en-US" dirty="0"/>
+          </a:p>
+        </p:txBody>
+      </p:sp>
+      <p:pic>
+        <p:nvPicPr>
+          <p:cNvPr id="44" name="Picture 43"/>
+          <p:cNvPicPr>
+            <a:picLocks noChangeAspect="1"/>
+          </p:cNvPicPr>
+          <p:nvPr/>
+        </p:nvPicPr>
+        <p:blipFill>
+          <a:blip r:embed="rId4" cstate="print">
+            <a:extLst>
+              <a:ext uri="{28A0092B-C50C-407E-A947-70E740481C1C}">
+                <a14:useLocalDpi xmlns:a14="http://schemas.microsoft.com/office/drawing/2010/main" val="0"/>
+              </a:ext>
+            </a:extLst>
+          </a:blip>
+          <a:stretch>
+            <a:fillRect/>
+          </a:stretch>
+        </p:blipFill>
+        <p:spPr>
+          <a:xfrm>
+            <a:off x="10965206" y="1160138"/>
+            <a:ext cx="1172201" cy="730562"/>
+          </a:xfrm>
+          <a:prstGeom prst="rect">
+            <a:avLst/>
+          </a:prstGeom>
+        </p:spPr>
+      </p:pic>
+      <p:pic>
+        <p:nvPicPr>
+          <p:cNvPr id="45" name="Picture 44"/>
+          <p:cNvPicPr>
+            <a:picLocks noChangeAspect="1"/>
+          </p:cNvPicPr>
+          <p:nvPr/>
+        </p:nvPicPr>
+        <p:blipFill>
+          <a:blip r:embed="rId5"/>
+          <a:stretch>
+            <a:fillRect/>
+          </a:stretch>
+        </p:blipFill>
+        <p:spPr>
+          <a:xfrm>
+            <a:off x="10916675" y="1999049"/>
+            <a:ext cx="1176087" cy="661549"/>
+          </a:xfrm>
+          <a:prstGeom prst="rect">
+            <a:avLst/>
+          </a:prstGeom>
+        </p:spPr>
+      </p:pic>
+      <p:pic>
+        <p:nvPicPr>
+          <p:cNvPr id="46" name="Picture 45"/>
+          <p:cNvPicPr>
+            <a:picLocks noChangeAspect="1"/>
+          </p:cNvPicPr>
+          <p:nvPr/>
+        </p:nvPicPr>
+        <p:blipFill>
+          <a:blip r:embed="rId6"/>
+          <a:stretch>
+            <a:fillRect/>
+          </a:stretch>
+        </p:blipFill>
+        <p:spPr>
+          <a:xfrm>
+            <a:off x="10986903" y="2742834"/>
+            <a:ext cx="1065754" cy="1065754"/>
+          </a:xfrm>
+          <a:prstGeom prst="rect">
+            <a:avLst/>
+          </a:prstGeom>
+        </p:spPr>
+      </p:pic>
+      <p:pic>
+        <p:nvPicPr>
+          <p:cNvPr id="14" name="Picture 7" descr="C:\Users\Ben\Downloads\IMG_5499.JPG"/>
+          <p:cNvPicPr>
+            <a:picLocks noChangeAspect="1" noChangeArrowheads="1"/>
+          </p:cNvPicPr>
+          <p:nvPr/>
+        </p:nvPicPr>
+        <p:blipFill rotWithShape="1">
+          <a:blip r:embed="rId7" cstate="print">
+            <a:extLst>
+              <a:ext uri="{28A0092B-C50C-407E-A947-70E740481C1C}">
+                <a14:useLocalDpi xmlns:a14="http://schemas.microsoft.com/office/drawing/2010/main" val="0"/>
+              </a:ext>
+            </a:extLst>
+          </a:blip>
+          <a:srcRect l="4339" t="8412" b="8457"/>
+          <a:stretch/>
+        </p:blipFill>
+        <p:spPr bwMode="auto">
+          <a:xfrm rot="10800000">
+            <a:off x="1821886" y="4021921"/>
+            <a:ext cx="3582870" cy="2335170"/>
+          </a:xfrm>
+          <a:prstGeom prst="rect">
+            <a:avLst/>
+          </a:prstGeom>
+          <a:noFill/>
+          <a:extLst>
+            <a:ext uri="{909E8E84-426E-40DD-AFC4-6F175D3DCCD1}">
+              <a14:hiddenFill xmlns:a14="http://schemas.microsoft.com/office/drawing/2010/main">
+                <a:solidFill>
+                  <a:srgbClr val="FFFFFF"/>
+                </a:solidFill>
+              </a14:hiddenFill>
+            </a:ext>
+          </a:extLst>
+        </p:spPr>
+      </p:pic>
+      <p:pic>
+        <p:nvPicPr>
+          <p:cNvPr id="15" name="Picture 8" descr="C:\Users\Ben\Downloads\IMG_5500.JPG"/>
+          <p:cNvPicPr>
+            <a:picLocks noChangeAspect="1" noChangeArrowheads="1"/>
+          </p:cNvPicPr>
+          <p:nvPr/>
+        </p:nvPicPr>
+        <p:blipFill rotWithShape="1">
+          <a:blip r:embed="rId8" cstate="print">
+            <a:extLst>
+              <a:ext uri="{28A0092B-C50C-407E-A947-70E740481C1C}">
+                <a14:useLocalDpi xmlns:a14="http://schemas.microsoft.com/office/drawing/2010/main" val="0"/>
+              </a:ext>
+            </a:extLst>
+          </a:blip>
+          <a:srcRect l="2296" t="4721" r="1904" b="13039"/>
+          <a:stretch/>
+        </p:blipFill>
+        <p:spPr bwMode="auto">
+          <a:xfrm rot="10800000">
+            <a:off x="6180219" y="3647006"/>
+            <a:ext cx="4033301" cy="2596777"/>
+          </a:xfrm>
+          <a:prstGeom prst="rect">
+            <a:avLst/>
+          </a:prstGeom>
+          <a:noFill/>
+          <a:extLst>
+            <a:ext uri="{909E8E84-426E-40DD-AFC4-6F175D3DCCD1}">
+              <a14:hiddenFill xmlns:a14="http://schemas.microsoft.com/office/drawing/2010/main">
+                <a:solidFill>
+                  <a:srgbClr val="FFFFFF"/>
+                </a:solidFill>
+              </a14:hiddenFill>
+            </a:ext>
+          </a:extLst>
+        </p:spPr>
+      </p:pic>
+    </p:spTree>
+    <p:extLst>
+      <p:ext uri="{BB962C8B-B14F-4D97-AF65-F5344CB8AC3E}">
+        <p14:creationId xmlns:p14="http://schemas.microsoft.com/office/powerpoint/2010/main" val="3373853750"/>
+      </p:ext>
+    </p:extLst>
+  </p:cSld>
+  <p:clrMapOvr>
+    <a:masterClrMapping/>
+  </p:clrMapOvr>
+  <p:timing>
+    <p:tnLst>
+      <p:par>
+        <p:cTn id="1" dur="indefinite" restart="never" nodeType="tmRoot"/>
+      </p:par>
+    </p:tnLst>
+  </p:timing>
+</p:sld>
+</file>
+
 <file path=ppt/theme/theme1.xml><?xml version="1.0" encoding="utf-8"?>
 <a:theme xmlns:a="http://schemas.openxmlformats.org/drawingml/2006/main" name="Wood Type">
   <a:themeElements>

</xml_diff>

<commit_message>
updated CDR/Team7_CDR.pptx with transpose content; fixed formatting in a couple places in README.pptx
</commit_message>
<xml_diff>
--- a/README.pptx
+++ b/README.pptx
@@ -111,7 +111,7 @@
   </p:defaultTextStyle>
   <p:extLst>
     <p:ext uri="{EFAFB233-063F-42B5-8137-9DF3F51BA10A}">
-      <p15:sldGuideLst xmlns:p15="http://schemas.microsoft.com/office/powerpoint/2012/main" xmlns="">
+      <p15:sldGuideLst xmlns="" xmlns:p15="http://schemas.microsoft.com/office/powerpoint/2012/main">
         <p15:guide id="1" orient="horz" pos="2160">
           <p15:clr>
             <a:srgbClr val="A4A3A4"/>
@@ -535,7 +535,7 @@
           <a:p>
             <a:fld id="{88C1F535-A5A1-4EA3-A78B-2FC391D9B3CD}" type="datetimeFigureOut">
               <a:rPr lang="en-US" smtClean="0"/>
-              <a:t>11/17/2017</a:t>
+              <a:t>11/18/2017</a:t>
             </a:fld>
             <a:endParaRPr lang="en-US"/>
           </a:p>
@@ -714,7 +714,7 @@
           <a:p>
             <a:fld id="{88C1F535-A5A1-4EA3-A78B-2FC391D9B3CD}" type="datetimeFigureOut">
               <a:rPr lang="en-US" smtClean="0"/>
-              <a:t>11/17/2017</a:t>
+              <a:t>11/18/2017</a:t>
             </a:fld>
             <a:endParaRPr lang="en-US"/>
           </a:p>
@@ -894,7 +894,7 @@
           <a:p>
             <a:fld id="{88C1F535-A5A1-4EA3-A78B-2FC391D9B3CD}" type="datetimeFigureOut">
               <a:rPr lang="en-US" smtClean="0"/>
-              <a:t>11/17/2017</a:t>
+              <a:t>11/18/2017</a:t>
             </a:fld>
             <a:endParaRPr lang="en-US"/>
           </a:p>
@@ -1064,7 +1064,7 @@
           <a:p>
             <a:fld id="{88C1F535-A5A1-4EA3-A78B-2FC391D9B3CD}" type="datetimeFigureOut">
               <a:rPr lang="en-US" smtClean="0"/>
-              <a:t>11/17/2017</a:t>
+              <a:t>11/18/2017</a:t>
             </a:fld>
             <a:endParaRPr lang="en-US"/>
           </a:p>
@@ -1377,7 +1377,7 @@
           <a:p>
             <a:fld id="{88C1F535-A5A1-4EA3-A78B-2FC391D9B3CD}" type="datetimeFigureOut">
               <a:rPr lang="en-US" smtClean="0"/>
-              <a:t>11/17/2017</a:t>
+              <a:t>11/18/2017</a:t>
             </a:fld>
             <a:endParaRPr lang="en-US"/>
           </a:p>
@@ -1763,7 +1763,7 @@
           <a:p>
             <a:fld id="{88C1F535-A5A1-4EA3-A78B-2FC391D9B3CD}" type="datetimeFigureOut">
               <a:rPr lang="en-US" smtClean="0"/>
-              <a:t>11/17/2017</a:t>
+              <a:t>11/18/2017</a:t>
             </a:fld>
             <a:endParaRPr lang="en-US"/>
           </a:p>
@@ -2197,7 +2197,7 @@
           <a:p>
             <a:fld id="{88C1F535-A5A1-4EA3-A78B-2FC391D9B3CD}" type="datetimeFigureOut">
               <a:rPr lang="en-US" smtClean="0"/>
-              <a:t>11/17/2017</a:t>
+              <a:t>11/18/2017</a:t>
             </a:fld>
             <a:endParaRPr lang="en-US"/>
           </a:p>
@@ -2315,7 +2315,7 @@
           <a:p>
             <a:fld id="{88C1F535-A5A1-4EA3-A78B-2FC391D9B3CD}" type="datetimeFigureOut">
               <a:rPr lang="en-US" smtClean="0"/>
-              <a:t>11/17/2017</a:t>
+              <a:t>11/18/2017</a:t>
             </a:fld>
             <a:endParaRPr lang="en-US"/>
           </a:p>
@@ -2410,7 +2410,7 @@
           <a:p>
             <a:fld id="{88C1F535-A5A1-4EA3-A78B-2FC391D9B3CD}" type="datetimeFigureOut">
               <a:rPr lang="en-US" smtClean="0"/>
-              <a:t>11/17/2017</a:t>
+              <a:t>11/18/2017</a:t>
             </a:fld>
             <a:endParaRPr lang="en-US"/>
           </a:p>
@@ -2760,7 +2760,7 @@
           <a:p>
             <a:fld id="{88C1F535-A5A1-4EA3-A78B-2FC391D9B3CD}" type="datetimeFigureOut">
               <a:rPr lang="en-US" smtClean="0"/>
-              <a:t>11/17/2017</a:t>
+              <a:t>11/18/2017</a:t>
             </a:fld>
             <a:endParaRPr lang="en-US"/>
           </a:p>
@@ -3185,7 +3185,7 @@
           <a:p>
             <a:fld id="{88C1F535-A5A1-4EA3-A78B-2FC391D9B3CD}" type="datetimeFigureOut">
               <a:rPr lang="en-US" smtClean="0"/>
-              <a:t>11/17/2017</a:t>
+              <a:t>11/18/2017</a:t>
             </a:fld>
             <a:endParaRPr lang="en-US"/>
           </a:p>
@@ -3466,7 +3466,7 @@
           <a:p>
             <a:fld id="{88C1F535-A5A1-4EA3-A78B-2FC391D9B3CD}" type="datetimeFigureOut">
               <a:rPr lang="en-US" smtClean="0"/>
-              <a:t>11/17/2017</a:t>
+              <a:t>11/18/2017</a:t>
             </a:fld>
             <a:endParaRPr lang="en-US"/>
           </a:p>
@@ -5996,9 +5996,9 @@
             <a:endParaRPr lang="en-US" b="1" dirty="0" smtClean="0"/>
           </a:p>
           <a:p>
-            <a:endParaRPr lang="en-US" b="1" dirty="0"/>
-          </a:p>
-          <a:p>
+            <a:pPr marL="0" indent="0">
+              <a:buNone/>
+            </a:pPr>
             <a:endParaRPr lang="en-US" b="1" dirty="0"/>
           </a:p>
           <a:p>
@@ -6123,7 +6123,7 @@
         <p:spPr bwMode="auto">
           <a:xfrm>
             <a:off x="5888025" y="1890700"/>
-            <a:ext cx="3778489" cy="2188079"/>
+            <a:ext cx="3320369" cy="1922787"/>
           </a:xfrm>
           <a:prstGeom prst="rect">
             <a:avLst/>
@@ -6176,8 +6176,8 @@
         </p:blipFill>
         <p:spPr bwMode="auto">
           <a:xfrm>
-            <a:off x="3279084" y="4422516"/>
-            <a:ext cx="3726303" cy="2394664"/>
+            <a:off x="3279084" y="4612824"/>
+            <a:ext cx="3211868" cy="2064069"/>
           </a:xfrm>
           <a:prstGeom prst="rect">
             <a:avLst/>
@@ -6230,7 +6230,7 @@
         </p:blipFill>
         <p:spPr bwMode="auto">
           <a:xfrm>
-            <a:off x="7232488" y="4612824"/>
+            <a:off x="7090821" y="4565220"/>
             <a:ext cx="3684187" cy="1794103"/>
           </a:xfrm>
           <a:prstGeom prst="rect">
@@ -8067,21 +8067,13 @@
           <a:p>
             <a:r>
               <a:rPr lang="en-US" b="1" dirty="0" smtClean="0"/>
-              <a:t>NOTE: The VGA is not completely functional, so some monitors may not be able to handle the unstable output</a:t>
-            </a:r>
+              <a:t>NOTE: The VGA is not completely functional, so some monitors may not be able to handle the unstable output.</a:t>
+            </a:r>
+          </a:p>
+          <a:p>
             <a:r>
               <a:rPr lang="en-US" b="1" dirty="0" smtClean="0"/>
-              <a:t>.</a:t>
-            </a:r>
-          </a:p>
-          <a:p>
-            <a:r>
-              <a:rPr lang="en-US" b="1" dirty="0" smtClean="0"/>
-              <a:t>Below </a:t>
-            </a:r>
-            <a:r>
-              <a:rPr lang="en-US" b="1" dirty="0" smtClean="0"/>
-              <a:t>are example outputs:</a:t>
+              <a:t>Below are example outputs:</a:t>
             </a:r>
             <a:endParaRPr lang="en-US" dirty="0"/>
           </a:p>
@@ -8186,7 +8178,7 @@
         </p:blipFill>
         <p:spPr bwMode="auto">
           <a:xfrm rot="10800000">
-            <a:off x="1821886" y="4021921"/>
+            <a:off x="1280973" y="4266620"/>
             <a:ext cx="3582870" cy="2335170"/>
           </a:xfrm>
           <a:prstGeom prst="rect">
@@ -8225,7 +8217,7 @@
         </p:blipFill>
         <p:spPr bwMode="auto">
           <a:xfrm rot="10800000">
-            <a:off x="6180219" y="3647006"/>
+            <a:off x="5806732" y="3808588"/>
             <a:ext cx="4033301" cy="2596777"/>
           </a:xfrm>
           <a:prstGeom prst="rect">
@@ -8486,7 +8478,7 @@
   <a:extraClrSchemeLst/>
   <a:extLst>
     <a:ext uri="{05A4C25C-085E-4340-85A3-A5531E510DB2}">
-      <thm15:themeFamily xmlns:thm15="http://schemas.microsoft.com/office/thememl/2012/main" xmlns="" name="Wood Type" id="{7ACABC62-BF99-48CF-A9DC-4DB89C7B13DC}" vid="{142A1326-48AB-42A9-8428-CB14AA30176D}"/>
+      <thm15:themeFamily xmlns="" xmlns:thm15="http://schemas.microsoft.com/office/thememl/2012/main" name="Wood Type" id="{7ACABC62-BF99-48CF-A9DC-4DB89C7B13DC}" vid="{142A1326-48AB-42A9-8428-CB14AA30176D}"/>
     </a:ext>
   </a:extLst>
 </a:theme>

</xml_diff>